<commit_message>
comment added in the code
</commit_message>
<xml_diff>
--- a/Documents/writeup/paper/images/computation analysis.pptx
+++ b/Documents/writeup/paper/images/computation analysis.pptx
@@ -5,11 +5,12 @@
     <p:sldMasterId id="2147483648" r:id="rId1"/>
   </p:sldMasterIdLst>
   <p:notesMasterIdLst>
-    <p:notesMasterId r:id="rId4"/>
+    <p:notesMasterId r:id="rId5"/>
   </p:notesMasterIdLst>
   <p:sldIdLst>
     <p:sldId id="1069" r:id="rId2"/>
     <p:sldId id="1072" r:id="rId3"/>
+    <p:sldId id="1073" r:id="rId4"/>
   </p:sldIdLst>
   <p:sldSz cx="12192000" cy="6858000"/>
   <p:notesSz cx="6858000" cy="9144000"/>
@@ -3778,8 +3779,8 @@
           </a:p>
         </p:txBody>
       </p:sp>
-      <mc:AlternateContent xmlns:mc="http://schemas.openxmlformats.org/markup-compatibility/2006">
-        <mc:Choice xmlns:a14="http://schemas.microsoft.com/office/drawing/2010/main" Requires="a14">
+      <mc:AlternateContent xmlns:mc="http://schemas.openxmlformats.org/markup-compatibility/2006" xmlns:a14="http://schemas.microsoft.com/office/drawing/2010/main">
+        <mc:Choice Requires="a14">
           <p:graphicFrame>
             <p:nvGraphicFramePr>
               <p:cNvPr id="4" name="Table 4">
@@ -4248,7 +4249,7 @@
             </a:graphic>
           </p:graphicFrame>
         </mc:Choice>
-        <mc:Fallback>
+        <mc:Fallback xmlns="">
           <p:graphicFrame>
             <p:nvGraphicFramePr>
               <p:cNvPr id="4" name="Table 4">
@@ -4793,8 +4794,8 @@
           </a:p>
         </p:txBody>
       </p:sp>
-      <mc:AlternateContent xmlns:mc="http://schemas.openxmlformats.org/markup-compatibility/2006">
-        <mc:Choice xmlns:a14="http://schemas.microsoft.com/office/drawing/2010/main" Requires="a14">
+      <mc:AlternateContent xmlns:mc="http://schemas.openxmlformats.org/markup-compatibility/2006" xmlns:a14="http://schemas.microsoft.com/office/drawing/2010/main">
+        <mc:Choice Requires="a14">
           <p:graphicFrame>
             <p:nvGraphicFramePr>
               <p:cNvPr id="4" name="Table 3">
@@ -5913,7 +5914,7 @@
             </a:graphic>
           </p:graphicFrame>
         </mc:Choice>
-        <mc:Fallback>
+        <mc:Fallback xmlns="">
           <p:graphicFrame>
             <p:nvGraphicFramePr>
               <p:cNvPr id="4" name="Table 3">
@@ -6707,6 +6708,191 @@
     <p:extLst>
       <p:ext uri="{BB962C8B-B14F-4D97-AF65-F5344CB8AC3E}">
         <p14:creationId xmlns:p14="http://schemas.microsoft.com/office/powerpoint/2010/main" val="3316070105"/>
+      </p:ext>
+    </p:extLst>
+  </p:cSld>
+  <p:clrMapOvr>
+    <a:masterClrMapping/>
+  </p:clrMapOvr>
+</p:sld>
+</file>
+
+<file path=ppt/slides/slide3.xml><?xml version="1.0" encoding="utf-8"?>
+<p:sld xmlns:a="http://schemas.openxmlformats.org/drawingml/2006/main" xmlns:r="http://schemas.openxmlformats.org/officeDocument/2006/relationships" xmlns:p="http://schemas.openxmlformats.org/presentationml/2006/main">
+  <p:cSld>
+    <p:spTree>
+      <p:nvGrpSpPr>
+        <p:cNvPr id="1" name=""/>
+        <p:cNvGrpSpPr/>
+        <p:nvPr/>
+      </p:nvGrpSpPr>
+      <p:grpSpPr>
+        <a:xfrm>
+          <a:off x="0" y="0"/>
+          <a:ext cx="0" cy="0"/>
+          <a:chOff x="0" y="0"/>
+          <a:chExt cx="0" cy="0"/>
+        </a:xfrm>
+      </p:grpSpPr>
+      <p:sp>
+        <p:nvSpPr>
+          <p:cNvPr id="2" name="Title 1">
+            <a:extLst>
+              <a:ext uri="{FF2B5EF4-FFF2-40B4-BE49-F238E27FC236}">
+                <a16:creationId xmlns:a16="http://schemas.microsoft.com/office/drawing/2014/main" id="{6A8F1DAE-DCE8-074A-9574-633E27C13108}"/>
+              </a:ext>
+            </a:extLst>
+          </p:cNvPr>
+          <p:cNvSpPr>
+            <a:spLocks noGrp="1"/>
+          </p:cNvSpPr>
+          <p:nvPr>
+            <p:ph type="title"/>
+          </p:nvPr>
+        </p:nvSpPr>
+        <p:spPr/>
+        <p:txBody>
+          <a:bodyPr/>
+          <a:lstStyle/>
+          <a:p>
+            <a:endParaRPr lang="en-US"/>
+          </a:p>
+        </p:txBody>
+      </p:sp>
+      <mc:AlternateContent xmlns:mc="http://schemas.openxmlformats.org/markup-compatibility/2006">
+        <mc:Choice xmlns:a14="http://schemas.microsoft.com/office/drawing/2010/main" Requires="a14">
+          <p:sp>
+            <p:nvSpPr>
+              <p:cNvPr id="3" name="Content Placeholder 2">
+                <a:extLst>
+                  <a:ext uri="{FF2B5EF4-FFF2-40B4-BE49-F238E27FC236}">
+                    <a16:creationId xmlns:a16="http://schemas.microsoft.com/office/drawing/2014/main" id="{B0000683-4622-1E4A-B7DE-7B9223D78A46}"/>
+                  </a:ext>
+                </a:extLst>
+              </p:cNvPr>
+              <p:cNvSpPr>
+                <a:spLocks noGrp="1"/>
+              </p:cNvSpPr>
+              <p:nvPr>
+                <p:ph idx="1"/>
+              </p:nvPr>
+            </p:nvSpPr>
+            <p:spPr/>
+            <p:txBody>
+              <a:bodyPr/>
+              <a:lstStyle/>
+              <a:p>
+                <a:r>
+                  <a:rPr lang="en-US" dirty="0"/>
+                  <a:t>DIDO(Fully Distributed with packed)</a:t>
+                </a:r>
+              </a:p>
+              <a:p>
+                <a:r>
+                  <a:rPr lang="en-US" dirty="0"/>
+                  <a:t>party1_round_1: 9 operations</a:t>
+                </a:r>
+              </a:p>
+              <a:p>
+                <a:pPr lvl="1"/>
+                <a:r>
+                  <a:rPr lang="en-US" dirty="0"/>
+                  <a:t>Party2_round_1: same</a:t>
+                </a:r>
+              </a:p>
+              <a:p>
+                <a:pPr lvl="2"/>
+                <a:r>
+                  <a:rPr lang="en-US" dirty="0"/>
+                  <a:t>Both K, </a:t>
+                </a:r>
+                <a14:m>
+                  <m:oMath xmlns:m="http://schemas.openxmlformats.org/officeDocument/2006/math">
+                    <m:r>
+                      <a:rPr lang="en-US" i="1" dirty="0" smtClean="0">
+                        <a:latin typeface="Cambria Math" panose="02040503050406030204" pitchFamily="18" charset="0"/>
+                      </a:rPr>
+                      <m:t>𝑅</m:t>
+                    </m:r>
+                    <m:sSub>
+                      <m:sSubPr>
+                        <m:ctrlPr>
+                          <a:rPr lang="en-US" i="1" dirty="0" smtClean="0">
+                            <a:latin typeface="Cambria Math" panose="02040503050406030204" pitchFamily="18" charset="0"/>
+                          </a:rPr>
+                        </m:ctrlPr>
+                      </m:sSubPr>
+                      <m:e>
+                        <m:r>
+                          <a:rPr lang="en-US" i="1" dirty="0" smtClean="0">
+                            <a:latin typeface="Cambria Math" panose="02040503050406030204" pitchFamily="18" charset="0"/>
+                          </a:rPr>
+                          <m:t>𝑘</m:t>
+                        </m:r>
+                      </m:e>
+                      <m:sub>
+                        <m:r>
+                          <a:rPr lang="en-US" i="1" dirty="0" smtClean="0">
+                            <a:latin typeface="Cambria Math" panose="02040503050406030204" pitchFamily="18" charset="0"/>
+                          </a:rPr>
+                          <m:t>1</m:t>
+                        </m:r>
+                      </m:sub>
+                    </m:sSub>
+                  </m:oMath>
+                </a14:m>
+                <a:r>
+                  <a:rPr lang="en-US" dirty="0"/>
+                  <a:t>  are Toeplitz</a:t>
+                </a:r>
+              </a:p>
+            </p:txBody>
+          </p:sp>
+        </mc:Choice>
+        <mc:Fallback>
+          <p:sp>
+            <p:nvSpPr>
+              <p:cNvPr id="3" name="Content Placeholder 2">
+                <a:extLst>
+                  <a:ext uri="{FF2B5EF4-FFF2-40B4-BE49-F238E27FC236}">
+                    <a16:creationId xmlns:a16="http://schemas.microsoft.com/office/drawing/2014/main" id="{B0000683-4622-1E4A-B7DE-7B9223D78A46}"/>
+                  </a:ext>
+                </a:extLst>
+              </p:cNvPr>
+              <p:cNvSpPr>
+                <a:spLocks noGrp="1" noRot="1" noChangeAspect="1" noMove="1" noResize="1" noEditPoints="1" noAdjustHandles="1" noChangeArrowheads="1" noChangeShapeType="1" noTextEdit="1"/>
+              </p:cNvSpPr>
+              <p:nvPr>
+                <p:ph idx="1"/>
+              </p:nvPr>
+            </p:nvSpPr>
+            <p:spPr>
+              <a:blipFill>
+                <a:blip r:embed="rId2"/>
+                <a:stretch>
+                  <a:fillRect l="-1086" t="-2326"/>
+                </a:stretch>
+              </a:blipFill>
+            </p:spPr>
+            <p:txBody>
+              <a:bodyPr/>
+              <a:lstStyle/>
+              <a:p>
+                <a:r>
+                  <a:rPr lang="en-US">
+                    <a:noFill/>
+                  </a:rPr>
+                  <a:t> </a:t>
+                </a:r>
+              </a:p>
+            </p:txBody>
+          </p:sp>
+        </mc:Fallback>
+      </mc:AlternateContent>
+    </p:spTree>
+    <p:extLst>
+      <p:ext uri="{BB962C8B-B14F-4D97-AF65-F5344CB8AC3E}">
+        <p14:creationId xmlns:p14="http://schemas.microsoft.com/office/powerpoint/2010/main" val="240158828"/>
       </p:ext>
     </p:extLst>
   </p:cSld>

</xml_diff>